<commit_message>
Update Big Data Presentation.pptx
</commit_message>
<xml_diff>
--- a/Big Data Presentation.pptx
+++ b/Big Data Presentation.pptx
@@ -135,6 +135,136 @@
 </p:presentation>
 </file>
 
+<file path=ppt/revisionInfo.xml><?xml version="1.0" encoding="utf-8"?>
+<p1510:revInfo xmlns:a="http://schemas.openxmlformats.org/drawingml/2006/main" xmlns:r="http://schemas.openxmlformats.org/officeDocument/2006/relationships" xmlns:p1510="http://schemas.microsoft.com/office/powerpoint/2015/10/main">
+  <p1510:revLst>
+    <p1510:client id="{4B8328CF-FC62-0B45-B543-E7CDC875F2A0}" v="103" dt="2021-12-01T00:53:30.464"/>
+    <p1510:client id="{F5412497-04BE-4C2F-A131-15328C8FED40}" v="14" dt="2021-12-01T00:44:32.614"/>
+  </p1510:revLst>
+</p1510:revInfo>
+</file>
+
+<file path=ppt/changesInfos/changesInfo1.xml><?xml version="1.0" encoding="utf-8"?>
+<pc:chgInfo xmlns:a="http://schemas.openxmlformats.org/drawingml/2006/main" xmlns:r="http://schemas.openxmlformats.org/officeDocument/2006/relationships" xmlns:ac="http://schemas.microsoft.com/office/drawing/2013/main/command" xmlns:pc="http://schemas.microsoft.com/office/powerpoint/2013/main/command">
+  <pc:docChgLst>
+    <pc:chgData name="Rajesh Makala" userId="26c735c7-ae3d-47f1-a0ea-791437088481" providerId="ADAL" clId="{4B8328CF-FC62-0B45-B543-E7CDC875F2A0}"/>
+    <pc:docChg chg="modSld">
+      <pc:chgData name="Rajesh Makala" userId="26c735c7-ae3d-47f1-a0ea-791437088481" providerId="ADAL" clId="{4B8328CF-FC62-0B45-B543-E7CDC875F2A0}" dt="2021-12-01T00:53:30.464" v="102" actId="20577"/>
+      <pc:docMkLst>
+        <pc:docMk/>
+      </pc:docMkLst>
+      <pc:sldChg chg="modSp mod">
+        <pc:chgData name="Rajesh Makala" userId="26c735c7-ae3d-47f1-a0ea-791437088481" providerId="ADAL" clId="{4B8328CF-FC62-0B45-B543-E7CDC875F2A0}" dt="2021-12-01T00:52:40.876" v="81" actId="20577"/>
+        <pc:sldMkLst>
+          <pc:docMk/>
+          <pc:sldMk cId="2919584190" sldId="386"/>
+        </pc:sldMkLst>
+        <pc:graphicFrameChg chg="modGraphic">
+          <ac:chgData name="Rajesh Makala" userId="26c735c7-ae3d-47f1-a0ea-791437088481" providerId="ADAL" clId="{4B8328CF-FC62-0B45-B543-E7CDC875F2A0}" dt="2021-12-01T00:52:40.876" v="81" actId="20577"/>
+          <ac:graphicFrameMkLst>
+            <pc:docMk/>
+            <pc:sldMk cId="2919584190" sldId="386"/>
+            <ac:graphicFrameMk id="3" creationId="{1EFC3353-0651-AA41-9EDF-4CF1D7745966}"/>
+          </ac:graphicFrameMkLst>
+        </pc:graphicFrameChg>
+      </pc:sldChg>
+      <pc:sldChg chg="modSp mod">
+        <pc:chgData name="Rajesh Makala" userId="26c735c7-ae3d-47f1-a0ea-791437088481" providerId="ADAL" clId="{4B8328CF-FC62-0B45-B543-E7CDC875F2A0}" dt="2021-12-01T00:53:03.324" v="96" actId="20577"/>
+        <pc:sldMkLst>
+          <pc:docMk/>
+          <pc:sldMk cId="10810166" sldId="387"/>
+        </pc:sldMkLst>
+        <pc:graphicFrameChg chg="modGraphic">
+          <ac:chgData name="Rajesh Makala" userId="26c735c7-ae3d-47f1-a0ea-791437088481" providerId="ADAL" clId="{4B8328CF-FC62-0B45-B543-E7CDC875F2A0}" dt="2021-12-01T00:53:03.324" v="96" actId="20577"/>
+          <ac:graphicFrameMkLst>
+            <pc:docMk/>
+            <pc:sldMk cId="10810166" sldId="387"/>
+            <ac:graphicFrameMk id="3" creationId="{1EFC3353-0651-AA41-9EDF-4CF1D7745966}"/>
+          </ac:graphicFrameMkLst>
+        </pc:graphicFrameChg>
+      </pc:sldChg>
+      <pc:sldChg chg="modSp mod">
+        <pc:chgData name="Rajesh Makala" userId="26c735c7-ae3d-47f1-a0ea-791437088481" providerId="ADAL" clId="{4B8328CF-FC62-0B45-B543-E7CDC875F2A0}" dt="2021-12-01T00:53:14.239" v="98" actId="20577"/>
+        <pc:sldMkLst>
+          <pc:docMk/>
+          <pc:sldMk cId="3010948306" sldId="388"/>
+        </pc:sldMkLst>
+        <pc:graphicFrameChg chg="modGraphic">
+          <ac:chgData name="Rajesh Makala" userId="26c735c7-ae3d-47f1-a0ea-791437088481" providerId="ADAL" clId="{4B8328CF-FC62-0B45-B543-E7CDC875F2A0}" dt="2021-12-01T00:53:14.239" v="98" actId="20577"/>
+          <ac:graphicFrameMkLst>
+            <pc:docMk/>
+            <pc:sldMk cId="3010948306" sldId="388"/>
+            <ac:graphicFrameMk id="3" creationId="{1EFC3353-0651-AA41-9EDF-4CF1D7745966}"/>
+          </ac:graphicFrameMkLst>
+        </pc:graphicFrameChg>
+      </pc:sldChg>
+      <pc:sldChg chg="modSp mod">
+        <pc:chgData name="Rajesh Makala" userId="26c735c7-ae3d-47f1-a0ea-791437088481" providerId="ADAL" clId="{4B8328CF-FC62-0B45-B543-E7CDC875F2A0}" dt="2021-12-01T00:53:30.464" v="102" actId="20577"/>
+        <pc:sldMkLst>
+          <pc:docMk/>
+          <pc:sldMk cId="3298212401" sldId="390"/>
+        </pc:sldMkLst>
+        <pc:graphicFrameChg chg="modGraphic">
+          <ac:chgData name="Rajesh Makala" userId="26c735c7-ae3d-47f1-a0ea-791437088481" providerId="ADAL" clId="{4B8328CF-FC62-0B45-B543-E7CDC875F2A0}" dt="2021-12-01T00:53:30.464" v="102" actId="20577"/>
+          <ac:graphicFrameMkLst>
+            <pc:docMk/>
+            <pc:sldMk cId="3298212401" sldId="390"/>
+            <ac:graphicFrameMk id="3" creationId="{1EFC3353-0651-AA41-9EDF-4CF1D7745966}"/>
+          </ac:graphicFrameMkLst>
+        </pc:graphicFrameChg>
+      </pc:sldChg>
+    </pc:docChg>
+  </pc:docChgLst>
+  <pc:docChgLst>
+    <pc:chgData name="Sree Pavani Sontam" userId="50c9ee02-1090-4022-a879-4df3189393a7" providerId="ADAL" clId="{F5412497-04BE-4C2F-A131-15328C8FED40}"/>
+    <pc:docChg chg="custSel modSld">
+      <pc:chgData name="Sree Pavani Sontam" userId="50c9ee02-1090-4022-a879-4df3189393a7" providerId="ADAL" clId="{F5412497-04BE-4C2F-A131-15328C8FED40}" dt="2021-12-01T00:44:32.614" v="111" actId="1076"/>
+      <pc:docMkLst>
+        <pc:docMk/>
+      </pc:docMkLst>
+      <pc:sldChg chg="modSp mod">
+        <pc:chgData name="Sree Pavani Sontam" userId="50c9ee02-1090-4022-a879-4df3189393a7" providerId="ADAL" clId="{F5412497-04BE-4C2F-A131-15328C8FED40}" dt="2021-11-30T23:38:52.899" v="27" actId="1076"/>
+        <pc:sldMkLst>
+          <pc:docMk/>
+          <pc:sldMk cId="369781722" sldId="324"/>
+        </pc:sldMkLst>
+        <pc:spChg chg="mod">
+          <ac:chgData name="Sree Pavani Sontam" userId="50c9ee02-1090-4022-a879-4df3189393a7" providerId="ADAL" clId="{F5412497-04BE-4C2F-A131-15328C8FED40}" dt="2021-11-30T23:38:52.899" v="27" actId="1076"/>
+          <ac:spMkLst>
+            <pc:docMk/>
+            <pc:sldMk cId="369781722" sldId="324"/>
+            <ac:spMk id="2" creationId="{4E24C20E-C3AF-497B-9C77-034C541C38D1}"/>
+          </ac:spMkLst>
+        </pc:spChg>
+      </pc:sldChg>
+      <pc:sldChg chg="addSp modSp mod">
+        <pc:chgData name="Sree Pavani Sontam" userId="50c9ee02-1090-4022-a879-4df3189393a7" providerId="ADAL" clId="{F5412497-04BE-4C2F-A131-15328C8FED40}" dt="2021-12-01T00:44:32.614" v="111" actId="1076"/>
+        <pc:sldMkLst>
+          <pc:docMk/>
+          <pc:sldMk cId="3382531688" sldId="392"/>
+        </pc:sldMkLst>
+        <pc:spChg chg="add mod">
+          <ac:chgData name="Sree Pavani Sontam" userId="50c9ee02-1090-4022-a879-4df3189393a7" providerId="ADAL" clId="{F5412497-04BE-4C2F-A131-15328C8FED40}" dt="2021-12-01T00:44:32.614" v="111" actId="1076"/>
+          <ac:spMkLst>
+            <pc:docMk/>
+            <pc:sldMk cId="3382531688" sldId="392"/>
+            <ac:spMk id="2" creationId="{F935FEA8-8F76-419A-9BBE-49A4BB746ABC}"/>
+          </ac:spMkLst>
+        </pc:spChg>
+        <pc:spChg chg="mod">
+          <ac:chgData name="Sree Pavani Sontam" userId="50c9ee02-1090-4022-a879-4df3189393a7" providerId="ADAL" clId="{F5412497-04BE-4C2F-A131-15328C8FED40}" dt="2021-12-01T00:43:57.285" v="104" actId="20577"/>
+          <ac:spMkLst>
+            <pc:docMk/>
+            <pc:sldMk cId="3382531688" sldId="392"/>
+            <ac:spMk id="7" creationId="{4FB0A4B7-4834-5743-A28E-B39BF0B90853}"/>
+          </ac:spMkLst>
+        </pc:spChg>
+      </pc:sldChg>
+    </pc:docChg>
+  </pc:docChgLst>
+</pc:chgInfo>
+</file>
+
 <file path=ppt/notesMasters/notesMaster1.xml><?xml version="1.0" encoding="utf-8"?>
 <p:notesMaster xmlns:a="http://schemas.openxmlformats.org/drawingml/2006/main" xmlns:r="http://schemas.openxmlformats.org/officeDocument/2006/relationships" xmlns:p="http://schemas.openxmlformats.org/presentationml/2006/main">
   <p:cSld>
@@ -1291,15 +1421,15 @@
           </a:lstStyle>
           <a:p>
             <a:r>
-              <a:rPr lang="en-US" dirty="0"/>
+              <a:rPr lang="en-US"/>
               <a:t>Balaji </a:t>
             </a:r>
             <a:r>
-              <a:rPr lang="en-US" dirty="0" err="1"/>
+              <a:rPr lang="en-US" err="1"/>
               <a:t>Padmanabhan</a:t>
             </a:r>
             <a:r>
-              <a:rPr lang="en-US" dirty="0"/>
+              <a:rPr lang="en-US"/>
               <a:t> © 2015</a:t>
             </a:r>
           </a:p>
@@ -1332,7 +1462,7 @@
               <a:rPr lang="en-US" smtClean="0"/>
               <a:t>‹#›</a:t>
             </a:fld>
-            <a:endParaRPr lang="en-US" dirty="0"/>
+            <a:endParaRPr lang="en-US"/>
           </a:p>
         </p:txBody>
       </p:sp>
@@ -3259,7 +3389,7 @@
           <a:lstStyle/>
           <a:p>
             <a:r>
-              <a:rPr lang="en-US" dirty="0"/>
+              <a:rPr lang="en-US"/>
               <a:t>Click to edit Master title style</a:t>
             </a:r>
           </a:p>
@@ -3648,11 +3778,11 @@
               <a:buNone/>
             </a:pPr>
             <a:r>
-              <a:rPr lang="en-US" b="1" dirty="0"/>
+              <a:rPr lang="en-US" b="1"/>
               <a:t>		</a:t>
             </a:r>
             <a:r>
-              <a:rPr lang="en-US" sz="4000" b="1" dirty="0">
+              <a:rPr lang="en-US" sz="4000" b="1">
                 <a:solidFill>
                   <a:srgbClr val="0F583A"/>
                 </a:solidFill>
@@ -3660,7 +3790,7 @@
               <a:t>ISM 6562 Big Data for Business</a:t>
             </a:r>
             <a:r>
-              <a:rPr lang="en-US" sz="4000" dirty="0">
+              <a:rPr lang="en-US" sz="4000">
                 <a:solidFill>
                   <a:srgbClr val="0F583A"/>
                 </a:solidFill>
@@ -3672,7 +3802,7 @@
             <a:pPr marL="0" indent="0">
               <a:buNone/>
             </a:pPr>
-            <a:endParaRPr lang="en-US" dirty="0">
+            <a:endParaRPr lang="en-US">
               <a:solidFill>
                 <a:srgbClr val="0F583A"/>
               </a:solidFill>
@@ -3682,7 +3812,7 @@
             <a:pPr marL="0" indent="0">
               <a:buNone/>
             </a:pPr>
-            <a:endParaRPr lang="en-US" dirty="0">
+            <a:endParaRPr lang="en-US">
               <a:solidFill>
                 <a:srgbClr val="0F583A"/>
               </a:solidFill>
@@ -3693,7 +3823,7 @@
               <a:buNone/>
             </a:pPr>
             <a:r>
-              <a:rPr lang="en-US" sz="2000" dirty="0">
+              <a:rPr lang="en-US" sz="2000">
                 <a:solidFill>
                   <a:srgbClr val="0F583A"/>
                 </a:solidFill>
@@ -3706,7 +3836,7 @@
               <a:buNone/>
             </a:pPr>
             <a:r>
-              <a:rPr lang="en-US" dirty="0">
+              <a:rPr lang="en-US">
                 <a:solidFill>
                   <a:srgbClr val="0F583A"/>
                 </a:solidFill>
@@ -3719,7 +3849,7 @@
               <a:buNone/>
             </a:pPr>
             <a:r>
-              <a:rPr lang="en-US" dirty="0">
+              <a:rPr lang="en-US">
                 <a:solidFill>
                   <a:srgbClr val="0F583A"/>
                 </a:solidFill>
@@ -3732,7 +3862,7 @@
               <a:buNone/>
             </a:pPr>
             <a:r>
-              <a:rPr lang="en-US" dirty="0">
+              <a:rPr lang="en-US">
                 <a:solidFill>
                   <a:srgbClr val="0F583A"/>
                 </a:solidFill>
@@ -3744,7 +3874,7 @@
             <a:pPr marL="0" indent="0">
               <a:buNone/>
             </a:pPr>
-            <a:endParaRPr lang="en-US" dirty="0">
+            <a:endParaRPr lang="en-US">
               <a:solidFill>
                 <a:srgbClr val="0F583A"/>
               </a:solidFill>
@@ -3766,8 +3896,8 @@
         </p:nvSpPr>
         <p:spPr>
           <a:xfrm>
-            <a:off x="2738581" y="1577109"/>
-            <a:ext cx="4207164" cy="584775"/>
+            <a:off x="2329227" y="1577109"/>
+            <a:ext cx="4895596" cy="584775"/>
           </a:xfrm>
           <a:prstGeom prst="rect">
             <a:avLst/>
@@ -3781,12 +3911,12 @@
           <a:lstStyle/>
           <a:p>
             <a:r>
-              <a:rPr lang="en-US" sz="3200" b="1" dirty="0">
+              <a:rPr lang="en-US" sz="3200" b="1">
                 <a:solidFill>
                   <a:srgbClr val="0F583A"/>
                 </a:solidFill>
               </a:rPr>
-              <a:t>Subscribe Term Deposit</a:t>
+              <a:t> Term Deposit Subscription</a:t>
             </a:r>
           </a:p>
         </p:txBody>
@@ -3844,17 +3974,17 @@
           <a:lstStyle/>
           <a:p>
             <a:r>
-              <a:rPr lang="en-US" dirty="0">
+              <a:rPr lang="en-US">
                 <a:latin typeface="+mn-lt"/>
               </a:rPr>
               <a:t>Business Conclusion:</a:t>
             </a:r>
             <a:br>
-              <a:rPr lang="en-US" dirty="0">
+              <a:rPr lang="en-US">
                 <a:latin typeface="+mn-lt"/>
               </a:rPr>
             </a:br>
-            <a:endParaRPr lang="en-US" altLang="en-US" dirty="0">
+            <a:endParaRPr lang="en-US" altLang="en-US">
               <a:latin typeface="+mn-lt"/>
             </a:endParaRPr>
           </a:p>
@@ -3884,19 +4014,19 @@
           <a:lstStyle/>
           <a:p>
             <a:r>
-              <a:rPr lang="en-US" sz="3100" dirty="0"/>
+              <a:rPr lang="en-US" sz="3100"/>
               <a:t>Promotion cost</a:t>
             </a:r>
           </a:p>
           <a:p>
             <a:r>
-              <a:rPr lang="en-US" sz="3100" dirty="0"/>
+              <a:rPr lang="en-US" sz="3100"/>
               <a:t>Profit per Customer</a:t>
             </a:r>
           </a:p>
           <a:p>
             <a:r>
-              <a:rPr lang="en-US" sz="3100" dirty="0"/>
+              <a:rPr lang="en-US" sz="3100"/>
               <a:t>Lift Curve and Profit Chart</a:t>
             </a:r>
           </a:p>
@@ -3955,7 +4085,7 @@
           <a:lstStyle/>
           <a:p>
             <a:r>
-              <a:rPr lang="en-US" altLang="en-US" dirty="0">
+              <a:rPr lang="en-US" altLang="en-US">
                 <a:latin typeface="+mn-lt"/>
               </a:rPr>
               <a:t>Problem Statement &amp; Dataset:</a:t>
@@ -3992,15 +4122,74 @@
           <a:lstStyle/>
           <a:p>
             <a:r>
-              <a:rPr lang="en-US" sz="3100" dirty="0"/>
+              <a:rPr lang="en-US" sz="3100"/>
               <a:t>Predicting Customer Bank Term Deposit Subscription</a:t>
             </a:r>
           </a:p>
           <a:p>
             <a:r>
-              <a:rPr lang="en-US" sz="3100" dirty="0"/>
+              <a:rPr lang="en-US" sz="3100"/>
               <a:t>Highlights of the dataset</a:t>
             </a:r>
+          </a:p>
+          <a:p>
+            <a:r>
+              <a:rPr lang="en-US" sz="3100"/>
+              <a:t>Below is the link for the dataset.</a:t>
+            </a:r>
+          </a:p>
+          <a:p>
+            <a:pPr marL="0" indent="0">
+              <a:buNone/>
+            </a:pPr>
+            <a:endParaRPr lang="en-US" sz="3100"/>
+          </a:p>
+          <a:p>
+            <a:pPr marL="0" indent="0">
+              <a:buNone/>
+            </a:pPr>
+            <a:endParaRPr lang="en-US" sz="3100"/>
+          </a:p>
+        </p:txBody>
+      </p:sp>
+      <p:sp>
+        <p:nvSpPr>
+          <p:cNvPr id="2" name="TextBox 1">
+            <a:extLst>
+              <a:ext uri="{FF2B5EF4-FFF2-40B4-BE49-F238E27FC236}">
+                <a16:creationId xmlns:a16="http://schemas.microsoft.com/office/drawing/2014/main" id="{F935FEA8-8F76-419A-9BBE-49A4BB746ABC}"/>
+              </a:ext>
+            </a:extLst>
+          </p:cNvPr>
+          <p:cNvSpPr txBox="1"/>
+          <p:nvPr/>
+        </p:nvSpPr>
+        <p:spPr>
+          <a:xfrm>
+            <a:off x="770860" y="4061637"/>
+            <a:ext cx="7915940" cy="1523494"/>
+          </a:xfrm>
+          <a:prstGeom prst="rect">
+            <a:avLst/>
+          </a:prstGeom>
+          <a:noFill/>
+        </p:spPr>
+        <p:txBody>
+          <a:bodyPr wrap="square" rtlCol="0">
+            <a:spAutoFit/>
+          </a:bodyPr>
+          <a:lstStyle/>
+          <a:p>
+            <a:r>
+              <a:rPr lang="en-US" sz="3100">
+                <a:hlinkClick r:id="rId2"/>
+              </a:rPr>
+              <a:t>https://www.kaggle.com/benroshan/bank-marketing-campaign-predictive-analytics/data</a:t>
+            </a:r>
+            <a:endParaRPr lang="en-US" sz="3100"/>
+          </a:p>
+          <a:p>
+            <a:endParaRPr lang="en-US" sz="3100"/>
           </a:p>
         </p:txBody>
       </p:sp>
@@ -4109,14 +4298,14 @@
           <a:p>
             <a:pPr algn="ctr"/>
             <a:r>
-              <a:rPr lang="en-US" dirty="0"/>
+              <a:rPr lang="en-US"/>
               <a:t>Dataset </a:t>
             </a:r>
           </a:p>
           <a:p>
             <a:pPr algn="ctr"/>
             <a:r>
-              <a:rPr lang="en-US" dirty="0"/>
+              <a:rPr lang="en-US"/>
               <a:t>Collection</a:t>
             </a:r>
           </a:p>
@@ -4213,14 +4402,14 @@
           <a:p>
             <a:pPr algn="ctr"/>
             <a:r>
-              <a:rPr lang="en-US" dirty="0"/>
+              <a:rPr lang="en-US"/>
               <a:t>Data </a:t>
             </a:r>
           </a:p>
           <a:p>
             <a:pPr algn="ctr"/>
             <a:r>
-              <a:rPr lang="en-US" dirty="0"/>
+              <a:rPr lang="en-US"/>
               <a:t>Preprocessing</a:t>
             </a:r>
           </a:p>
@@ -4271,7 +4460,7 @@
           <a:lstStyle/>
           <a:p>
             <a:pPr algn="ctr"/>
-            <a:endParaRPr lang="en-US" dirty="0"/>
+            <a:endParaRPr lang="en-US"/>
           </a:p>
         </p:txBody>
       </p:sp>
@@ -4321,14 +4510,14 @@
           <a:p>
             <a:pPr algn="ctr"/>
             <a:r>
-              <a:rPr lang="en-US" dirty="0"/>
+              <a:rPr lang="en-US"/>
               <a:t>Subscribe</a:t>
             </a:r>
           </a:p>
           <a:p>
             <a:pPr algn="ctr"/>
             <a:r>
-              <a:rPr lang="en-US" dirty="0"/>
+              <a:rPr lang="en-US"/>
               <a:t>Term Deposit</a:t>
             </a:r>
           </a:p>
@@ -4467,14 +4656,14 @@
           <a:p>
             <a:pPr algn="ctr"/>
             <a:r>
-              <a:rPr lang="en-US" dirty="0"/>
+              <a:rPr lang="en-US"/>
               <a:t>Results &amp;</a:t>
             </a:r>
           </a:p>
           <a:p>
             <a:pPr algn="ctr"/>
             <a:r>
-              <a:rPr lang="en-US" dirty="0"/>
+              <a:rPr lang="en-US"/>
               <a:t>Analysis</a:t>
             </a:r>
           </a:p>
@@ -4526,14 +4715,14 @@
           <a:p>
             <a:pPr algn="ctr"/>
             <a:r>
-              <a:rPr lang="en-US" dirty="0"/>
+              <a:rPr lang="en-US"/>
               <a:t>Performance</a:t>
             </a:r>
           </a:p>
           <a:p>
             <a:pPr algn="ctr"/>
             <a:r>
-              <a:rPr lang="en-US" dirty="0"/>
+              <a:rPr lang="en-US"/>
               <a:t>Evaluation</a:t>
             </a:r>
           </a:p>
@@ -4719,7 +4908,7 @@
           <a:p>
             <a:pPr algn="ctr"/>
             <a:r>
-              <a:rPr lang="en-US" dirty="0"/>
+              <a:rPr lang="en-US"/>
               <a:t>Decision Tree</a:t>
             </a:r>
           </a:p>
@@ -4771,14 +4960,14 @@
           <a:p>
             <a:pPr algn="ctr"/>
             <a:r>
-              <a:rPr lang="en-US" dirty="0"/>
+              <a:rPr lang="en-US"/>
               <a:t>Logistic </a:t>
             </a:r>
           </a:p>
           <a:p>
             <a:pPr algn="ctr"/>
             <a:r>
-              <a:rPr lang="en-US" dirty="0"/>
+              <a:rPr lang="en-US"/>
               <a:t>Regression</a:t>
             </a:r>
           </a:p>
@@ -4918,7 +5107,7 @@
           <a:p>
             <a:pPr algn="ctr"/>
             <a:r>
-              <a:rPr lang="en-US" sz="1700" dirty="0"/>
+              <a:rPr lang="en-US" sz="1700"/>
               <a:t>Gradient Boosting Classifier</a:t>
             </a:r>
           </a:p>
@@ -4970,14 +5159,14 @@
           <a:p>
             <a:pPr algn="ctr"/>
             <a:r>
-              <a:rPr lang="en-US" dirty="0"/>
+              <a:rPr lang="en-US"/>
               <a:t>Random Forest</a:t>
             </a:r>
           </a:p>
           <a:p>
             <a:pPr algn="ctr"/>
             <a:r>
-              <a:rPr lang="en-US" dirty="0"/>
+              <a:rPr lang="en-US"/>
               <a:t>Classifier</a:t>
             </a:r>
           </a:p>
@@ -5012,7 +5201,7 @@
           <a:lstStyle/>
           <a:p>
             <a:r>
-              <a:rPr lang="en-US" sz="3600" b="1" dirty="0">
+              <a:rPr lang="en-US" sz="3600" b="1">
                 <a:solidFill>
                   <a:srgbClr val="0F583A"/>
                 </a:solidFill>
@@ -5081,7 +5270,7 @@
           <a:lstStyle/>
           <a:p>
             <a:r>
-              <a:rPr lang="en-US" sz="3100" dirty="0">
+              <a:rPr lang="en-US" sz="3100">
                 <a:solidFill>
                   <a:schemeClr val="dk1"/>
                 </a:solidFill>
@@ -5091,7 +5280,7 @@
           </a:p>
           <a:p>
             <a:r>
-              <a:rPr lang="en-US" sz="3100" dirty="0">
+              <a:rPr lang="en-US" sz="3100">
                 <a:solidFill>
                   <a:schemeClr val="dk1"/>
                 </a:solidFill>
@@ -5101,7 +5290,7 @@
           </a:p>
           <a:p>
             <a:r>
-              <a:rPr lang="en-US" sz="3100" dirty="0">
+              <a:rPr lang="en-US" sz="3100">
                 <a:solidFill>
                   <a:schemeClr val="dk1"/>
                 </a:solidFill>
@@ -5111,7 +5300,7 @@
           </a:p>
           <a:p>
             <a:r>
-              <a:rPr lang="en-US" sz="3100" dirty="0">
+              <a:rPr lang="en-US" sz="3100">
                 <a:solidFill>
                   <a:schemeClr val="dk1"/>
                 </a:solidFill>
@@ -5148,7 +5337,7 @@
           <a:lstStyle/>
           <a:p>
             <a:r>
-              <a:rPr lang="en-US" dirty="0">
+              <a:rPr lang="en-US">
                 <a:latin typeface="+mn-lt"/>
               </a:rPr>
               <a:t>Models Used:</a:t>
@@ -5209,7 +5398,7 @@
           <a:lstStyle/>
           <a:p>
             <a:r>
-              <a:rPr lang="en-US" altLang="en-US" dirty="0">
+              <a:rPr lang="en-US" altLang="en-US">
                 <a:latin typeface="+mn-lt"/>
               </a:rPr>
               <a:t>Results:</a:t>
@@ -5246,25 +5435,25 @@
           <a:lstStyle/>
           <a:p>
             <a:r>
-              <a:rPr lang="en-US" sz="3100" dirty="0"/>
+              <a:rPr lang="en-US" sz="3100"/>
               <a:t>Accuracy</a:t>
             </a:r>
           </a:p>
           <a:p>
             <a:r>
-              <a:rPr lang="en-US" sz="3100" dirty="0"/>
+              <a:rPr lang="en-US" sz="3100"/>
               <a:t>Confusion Matrix</a:t>
             </a:r>
           </a:p>
           <a:p>
             <a:r>
-              <a:rPr lang="en-US" sz="3100" dirty="0"/>
+              <a:rPr lang="en-US" sz="3100"/>
               <a:t>Area under ROC and PR Curves</a:t>
             </a:r>
           </a:p>
           <a:p>
             <a:r>
-              <a:rPr lang="en-US" sz="3100" dirty="0"/>
+              <a:rPr lang="en-US" sz="3100"/>
               <a:t>Precision and Recall scores</a:t>
             </a:r>
           </a:p>
@@ -5323,12 +5512,12 @@
           <a:lstStyle/>
           <a:p>
             <a:r>
-              <a:rPr lang="en-US" dirty="0">
+              <a:rPr lang="en-US">
                 <a:latin typeface="+mn-lt"/>
               </a:rPr>
               <a:t>Accuracy:</a:t>
             </a:r>
-            <a:endParaRPr lang="en-US" altLang="en-US" dirty="0">
+            <a:endParaRPr lang="en-US" altLang="en-US">
               <a:latin typeface="+mn-lt"/>
             </a:endParaRPr>
           </a:p>
@@ -5350,7 +5539,7 @@
             <p:ph idx="1"/>
             <p:extLst>
               <p:ext uri="{D42A27DB-BD31-4B8C-83A1-F6EECF244321}">
-                <p14:modId xmlns:p14="http://schemas.microsoft.com/office/powerpoint/2010/main" val="2461585756"/>
+                <p14:modId xmlns:p14="http://schemas.microsoft.com/office/powerpoint/2010/main" val="253202288"/>
               </p:ext>
             </p:extLst>
           </p:nvPr>
@@ -5389,7 +5578,7 @@
                     <a:p>
                       <a:pPr algn="ctr"/>
                       <a:r>
-                        <a:rPr lang="en-US" sz="2800" dirty="0"/>
+                        <a:rPr lang="en-US" sz="2800"/>
                         <a:t>Model</a:t>
                       </a:r>
                     </a:p>
@@ -5403,7 +5592,7 @@
                     <a:p>
                       <a:pPr algn="ctr"/>
                       <a:r>
-                        <a:rPr lang="en-US" sz="2800" dirty="0"/>
+                        <a:rPr lang="en-US" sz="2800"/>
                         <a:t>Accuracy</a:t>
                       </a:r>
                     </a:p>
@@ -5440,7 +5629,7 @@
                         <a:defRPr/>
                       </a:pPr>
                       <a:r>
-                        <a:rPr lang="en-US" sz="2400" b="1" i="0" kern="1200" dirty="0">
+                        <a:rPr lang="en-US" sz="2400" b="1" i="0" kern="1200">
                           <a:solidFill>
                             <a:schemeClr val="dk1"/>
                           </a:solidFill>
@@ -5462,8 +5651,8 @@
                     <a:p>
                       <a:pPr algn="ctr"/>
                       <a:r>
-                        <a:rPr lang="en-US" sz="2400" b="1" u="sng" dirty="0"/>
-                        <a:t>90.6%</a:t>
+                        <a:rPr lang="en-US" sz="2400" b="1" u="sng"/>
+                        <a:t>90.4%</a:t>
                       </a:r>
                     </a:p>
                   </a:txBody>
@@ -5483,7 +5672,7 @@
                     <a:p>
                       <a:pPr algn="ctr"/>
                       <a:r>
-                        <a:rPr lang="en-US" sz="2400" b="1" i="0" kern="1200" dirty="0">
+                        <a:rPr lang="en-US" sz="2400" b="1" i="0" kern="1200">
                           <a:solidFill>
                             <a:schemeClr val="dk1"/>
                           </a:solidFill>
@@ -5505,7 +5694,7 @@
                     <a:p>
                       <a:pPr algn="ctr"/>
                       <a:r>
-                        <a:rPr lang="en-US" sz="2400" b="0" i="0" kern="1200" dirty="0">
+                        <a:rPr lang="en-US" sz="2400" b="0" i="0" kern="1200">
                           <a:solidFill>
                             <a:schemeClr val="dk1"/>
                           </a:solidFill>
@@ -5514,7 +5703,7 @@
                           <a:ea typeface="+mn-ea"/>
                           <a:cs typeface="+mn-cs"/>
                         </a:rPr>
-                        <a:t>89.8%</a:t>
+                        <a:t>89.6%</a:t>
                       </a:r>
                     </a:p>
                   </a:txBody>
@@ -5534,7 +5723,7 @@
                     <a:p>
                       <a:pPr algn="ctr"/>
                       <a:r>
-                        <a:rPr lang="en-US" sz="2400" b="1" i="0" kern="1200" dirty="0">
+                        <a:rPr lang="en-US" sz="2400" b="1" i="0" kern="1200">
                           <a:solidFill>
                             <a:schemeClr val="dk1"/>
                           </a:solidFill>
@@ -5556,7 +5745,7 @@
                     <a:p>
                       <a:pPr algn="ctr"/>
                       <a:r>
-                        <a:rPr lang="en-US" sz="2400" b="0" i="0" kern="1200" dirty="0">
+                        <a:rPr lang="en-US" sz="2400" b="0" i="0" kern="1200">
                           <a:solidFill>
                             <a:schemeClr val="dk1"/>
                           </a:solidFill>
@@ -5565,7 +5754,7 @@
                           <a:ea typeface="+mn-ea"/>
                           <a:cs typeface="+mn-cs"/>
                         </a:rPr>
-                        <a:t>89.3%</a:t>
+                        <a:t>89.2%</a:t>
                       </a:r>
                     </a:p>
                   </a:txBody>
@@ -5585,7 +5774,7 @@
                     <a:p>
                       <a:pPr algn="ctr"/>
                       <a:r>
-                        <a:rPr lang="en-US" sz="2400" b="1" i="0" kern="1200" dirty="0">
+                        <a:rPr lang="en-US" sz="2400" b="1" i="0" kern="1200">
                           <a:solidFill>
                             <a:schemeClr val="dk1"/>
                           </a:solidFill>
@@ -5607,7 +5796,7 @@
                     <a:p>
                       <a:pPr algn="ctr"/>
                       <a:r>
-                        <a:rPr lang="en-US" sz="2400" b="0" i="0" kern="1200" dirty="0">
+                        <a:rPr lang="en-US" sz="2400" b="0" i="0" kern="1200">
                           <a:solidFill>
                             <a:schemeClr val="dk1"/>
                           </a:solidFill>
@@ -5616,7 +5805,7 @@
                           <a:ea typeface="+mn-ea"/>
                           <a:cs typeface="+mn-cs"/>
                         </a:rPr>
-                        <a:t>89.9%</a:t>
+                        <a:t>89.8%</a:t>
                       </a:r>
                     </a:p>
                   </a:txBody>
@@ -5685,17 +5874,17 @@
           <a:lstStyle/>
           <a:p>
             <a:r>
-              <a:rPr lang="en-US" dirty="0">
+              <a:rPr lang="en-US">
                 <a:latin typeface="+mn-lt"/>
               </a:rPr>
               <a:t>Confusion Matrix:</a:t>
             </a:r>
             <a:br>
-              <a:rPr lang="en-US" dirty="0">
+              <a:rPr lang="en-US">
                 <a:latin typeface="+mn-lt"/>
               </a:rPr>
             </a:br>
-            <a:endParaRPr lang="en-US" altLang="en-US" dirty="0">
+            <a:endParaRPr lang="en-US" altLang="en-US">
               <a:latin typeface="+mn-lt"/>
             </a:endParaRPr>
           </a:p>
@@ -5717,7 +5906,7 @@
             <p:ph idx="1"/>
             <p:extLst>
               <p:ext uri="{D42A27DB-BD31-4B8C-83A1-F6EECF244321}">
-                <p14:modId xmlns:p14="http://schemas.microsoft.com/office/powerpoint/2010/main" val="1403386392"/>
+                <p14:modId xmlns:p14="http://schemas.microsoft.com/office/powerpoint/2010/main" val="2433274711"/>
               </p:ext>
             </p:extLst>
           </p:nvPr>
@@ -5756,7 +5945,7 @@
                     <a:p>
                       <a:pPr algn="ctr"/>
                       <a:r>
-                        <a:rPr lang="en-US" sz="2800" dirty="0"/>
+                        <a:rPr lang="en-US" sz="2800"/>
                         <a:t>Model</a:t>
                       </a:r>
                     </a:p>
@@ -5770,7 +5959,7 @@
                     <a:p>
                       <a:pPr algn="ctr"/>
                       <a:r>
-                        <a:rPr lang="en-US" sz="2800" dirty="0"/>
+                        <a:rPr lang="en-US" sz="2800"/>
                         <a:t>Confusion Matrix</a:t>
                       </a:r>
                     </a:p>
@@ -5807,7 +5996,7 @@
                         <a:defRPr/>
                       </a:pPr>
                       <a:r>
-                        <a:rPr lang="en-US" sz="2400" b="1" i="0" kern="1200" dirty="0">
+                        <a:rPr lang="en-US" sz="2400" b="1" i="0" kern="1200">
                           <a:solidFill>
                             <a:schemeClr val="dk1"/>
                           </a:solidFill>
@@ -5829,7 +6018,7 @@
                     <a:p>
                       <a:pPr algn="ctr"/>
                       <a:r>
-                        <a:rPr lang="en-US" sz="1800" b="1" i="0" u="none" kern="1200" dirty="0">
+                        <a:rPr lang="en-US" sz="1800" b="1" i="0" u="none" kern="1200">
                           <a:solidFill>
                             <a:schemeClr val="dk1"/>
                           </a:solidFill>
@@ -5838,13 +6027,13 @@
                           <a:ea typeface="+mn-ea"/>
                           <a:cs typeface="+mn-cs"/>
                         </a:rPr>
-                        <a:t>[7171      183] </a:t>
+                        <a:t>[7083      161] </a:t>
                       </a:r>
                     </a:p>
                     <a:p>
                       <a:pPr algn="ctr"/>
                       <a:r>
-                        <a:rPr lang="en-US" sz="1800" b="1" i="0" u="none" kern="1200" dirty="0">
+                        <a:rPr lang="en-US" sz="1800" b="1" i="0" u="none" kern="1200">
                           <a:solidFill>
                             <a:schemeClr val="dk1"/>
                           </a:solidFill>
@@ -5853,9 +6042,9 @@
                           <a:ea typeface="+mn-ea"/>
                           <a:cs typeface="+mn-cs"/>
                         </a:rPr>
-                        <a:t>[ 594       341]</a:t>
+                        <a:t>[ 615       306]</a:t>
                       </a:r>
-                      <a:endParaRPr lang="en-US" sz="2400" b="1" u="none" dirty="0"/>
+                      <a:endParaRPr lang="en-US" sz="2400" b="1" u="none"/>
                     </a:p>
                   </a:txBody>
                   <a:tcPr/>
@@ -5874,7 +6063,7 @@
                     <a:p>
                       <a:pPr algn="ctr"/>
                       <a:r>
-                        <a:rPr lang="en-US" sz="2400" b="1" i="0" kern="1200" dirty="0">
+                        <a:rPr lang="en-US" sz="2400" b="1" i="0" kern="1200">
                           <a:solidFill>
                             <a:schemeClr val="dk1"/>
                           </a:solidFill>
@@ -5896,7 +6085,7 @@
                     <a:p>
                       <a:pPr algn="ctr"/>
                       <a:r>
-                        <a:rPr lang="en-US" sz="1800" b="0" i="0" kern="1200" dirty="0">
+                        <a:rPr lang="en-US" sz="1800" b="0" i="0" kern="1200">
                           <a:solidFill>
                             <a:schemeClr val="dk1"/>
                           </a:solidFill>
@@ -5905,13 +6094,13 @@
                           <a:ea typeface="+mn-ea"/>
                           <a:cs typeface="+mn-cs"/>
                         </a:rPr>
-                        <a:t>[7293        61] </a:t>
+                        <a:t>[7152        92] </a:t>
                       </a:r>
                     </a:p>
                     <a:p>
                       <a:pPr algn="ctr"/>
                       <a:r>
-                        <a:rPr lang="en-US" sz="1800" b="0" i="0" kern="1200" dirty="0">
+                        <a:rPr lang="en-US" sz="1800" b="0" i="0" kern="1200">
                           <a:solidFill>
                             <a:schemeClr val="dk1"/>
                           </a:solidFill>
@@ -5920,9 +6109,9 @@
                           <a:ea typeface="+mn-ea"/>
                           <a:cs typeface="+mn-cs"/>
                         </a:rPr>
-                        <a:t>[ 784       151]</a:t>
+                        <a:t>[ 755       166]</a:t>
                       </a:r>
-                      <a:endParaRPr lang="en-US" sz="2400" b="1" i="0" kern="1200" dirty="0">
+                      <a:endParaRPr lang="en-US" sz="2400" b="1" i="0" kern="1200">
                         <a:solidFill>
                           <a:schemeClr val="dk1"/>
                         </a:solidFill>
@@ -5949,7 +6138,7 @@
                     <a:p>
                       <a:pPr algn="ctr"/>
                       <a:r>
-                        <a:rPr lang="en-US" sz="2400" b="1" i="0" kern="1200" dirty="0">
+                        <a:rPr lang="en-US" sz="2400" b="1" i="0" kern="1200">
                           <a:solidFill>
                             <a:schemeClr val="dk1"/>
                           </a:solidFill>
@@ -5971,7 +6160,7 @@
                     <a:p>
                       <a:pPr algn="ctr"/>
                       <a:r>
-                        <a:rPr lang="en-US" sz="1800" b="0" i="0" kern="1200" dirty="0">
+                        <a:rPr lang="en-US" sz="1800" b="0" i="0" kern="1200">
                           <a:solidFill>
                             <a:schemeClr val="dk1"/>
                           </a:solidFill>
@@ -5980,13 +6169,13 @@
                           <a:ea typeface="+mn-ea"/>
                           <a:cs typeface="+mn-cs"/>
                         </a:rPr>
-                        <a:t>[7339        15] </a:t>
+                        <a:t>[7214        30] </a:t>
                       </a:r>
                     </a:p>
                     <a:p>
                       <a:pPr algn="ctr"/>
                       <a:r>
-                        <a:rPr lang="en-US" sz="1800" b="0" i="0" kern="1200" dirty="0">
+                        <a:rPr lang="en-US" sz="1800" b="0" i="0" kern="1200">
                           <a:solidFill>
                             <a:schemeClr val="dk1"/>
                           </a:solidFill>
@@ -5995,9 +6184,9 @@
                           <a:ea typeface="+mn-ea"/>
                           <a:cs typeface="+mn-cs"/>
                         </a:rPr>
-                        <a:t>[ 870         65]</a:t>
+                        <a:t>[ 846         75]</a:t>
                       </a:r>
-                      <a:endParaRPr lang="en-US" sz="2400" b="1" i="0" kern="1200" dirty="0">
+                      <a:endParaRPr lang="en-US" sz="2400" b="1" i="0" kern="1200">
                         <a:solidFill>
                           <a:schemeClr val="dk1"/>
                         </a:solidFill>
@@ -6024,7 +6213,7 @@
                     <a:p>
                       <a:pPr algn="ctr"/>
                       <a:r>
-                        <a:rPr lang="en-US" sz="2400" b="1" i="0" kern="1200" dirty="0">
+                        <a:rPr lang="en-US" sz="2400" b="1" i="0" kern="1200">
                           <a:solidFill>
                             <a:schemeClr val="dk1"/>
                           </a:solidFill>
@@ -6046,7 +6235,7 @@
                     <a:p>
                       <a:pPr algn="ctr"/>
                       <a:r>
-                        <a:rPr lang="en-US" sz="1800" b="0" i="0" kern="1200" dirty="0">
+                        <a:rPr lang="en-US" sz="1800" b="0" i="0" kern="1200">
                           <a:solidFill>
                             <a:schemeClr val="dk1"/>
                           </a:solidFill>
@@ -6055,13 +6244,13 @@
                           <a:ea typeface="+mn-ea"/>
                           <a:cs typeface="+mn-cs"/>
                         </a:rPr>
-                        <a:t>[7256        98] </a:t>
+                        <a:t>[7122        122] </a:t>
                       </a:r>
                     </a:p>
                     <a:p>
                       <a:pPr algn="ctr"/>
                       <a:r>
-                        <a:rPr lang="en-US" sz="1800" b="0" i="0" kern="1200" dirty="0">
+                        <a:rPr lang="en-US" sz="1800" b="0" i="0" kern="1200">
                           <a:solidFill>
                             <a:schemeClr val="dk1"/>
                           </a:solidFill>
@@ -6070,9 +6259,9 @@
                           <a:ea typeface="+mn-ea"/>
                           <a:cs typeface="+mn-cs"/>
                         </a:rPr>
-                        <a:t>[ 731       204]</a:t>
+                        <a:t>[ 707       214]</a:t>
                       </a:r>
-                      <a:endParaRPr lang="en-US" sz="2400" b="1" i="0" kern="1200" dirty="0">
+                      <a:endParaRPr lang="en-US" sz="2400" b="1" i="0" kern="1200">
                         <a:solidFill>
                           <a:schemeClr val="dk1"/>
                         </a:solidFill>
@@ -6148,17 +6337,17 @@
           <a:lstStyle/>
           <a:p>
             <a:r>
-              <a:rPr lang="en-US" dirty="0">
+              <a:rPr lang="en-US">
                 <a:latin typeface="+mn-lt"/>
               </a:rPr>
               <a:t>Area under ROC and PR curves:</a:t>
             </a:r>
             <a:br>
-              <a:rPr lang="en-US" dirty="0">
+              <a:rPr lang="en-US">
                 <a:latin typeface="+mn-lt"/>
               </a:rPr>
             </a:br>
-            <a:endParaRPr lang="en-US" altLang="en-US" dirty="0">
+            <a:endParaRPr lang="en-US" altLang="en-US">
               <a:latin typeface="+mn-lt"/>
             </a:endParaRPr>
           </a:p>
@@ -6180,7 +6369,7 @@
             <p:ph idx="1"/>
             <p:extLst>
               <p:ext uri="{D42A27DB-BD31-4B8C-83A1-F6EECF244321}">
-                <p14:modId xmlns:p14="http://schemas.microsoft.com/office/powerpoint/2010/main" val="2138602681"/>
+                <p14:modId xmlns:p14="http://schemas.microsoft.com/office/powerpoint/2010/main" val="3760005649"/>
               </p:ext>
             </p:extLst>
           </p:nvPr>
@@ -6226,7 +6415,7 @@
                     <a:p>
                       <a:pPr algn="ctr"/>
                       <a:r>
-                        <a:rPr lang="en-US" sz="2800" dirty="0"/>
+                        <a:rPr lang="en-US" sz="2800"/>
                         <a:t>Model</a:t>
                       </a:r>
                     </a:p>
@@ -6240,7 +6429,7 @@
                     <a:p>
                       <a:pPr algn="ctr"/>
                       <a:r>
-                        <a:rPr lang="en-US" sz="1800" b="1" i="0" kern="1200" dirty="0">
+                        <a:rPr lang="en-US" sz="1800" b="1" i="0" kern="1200">
                           <a:solidFill>
                             <a:schemeClr val="lt1"/>
                           </a:solidFill>
@@ -6255,7 +6444,7 @@
                     <a:p>
                       <a:pPr algn="ctr"/>
                       <a:r>
-                        <a:rPr lang="en-US" sz="1800" b="1" i="0" kern="1200" dirty="0">
+                        <a:rPr lang="en-US" sz="1800" b="1" i="0" kern="1200">
                           <a:solidFill>
                             <a:schemeClr val="lt1"/>
                           </a:solidFill>
@@ -6266,7 +6455,7 @@
                         </a:rPr>
                         <a:t> ROC curve</a:t>
                       </a:r>
-                      <a:endParaRPr lang="en-US" sz="2800" b="1" dirty="0"/>
+                      <a:endParaRPr lang="en-US" sz="2800" b="1"/>
                     </a:p>
                   </a:txBody>
                   <a:tcPr/>
@@ -6278,7 +6467,7 @@
                     <a:p>
                       <a:pPr algn="ctr"/>
                       <a:r>
-                        <a:rPr lang="en-US" sz="1800" b="1" i="0" kern="1200" dirty="0">
+                        <a:rPr lang="en-US" sz="1800" b="1" i="0" kern="1200">
                           <a:solidFill>
                             <a:schemeClr val="lt1"/>
                           </a:solidFill>
@@ -6293,7 +6482,7 @@
                     <a:p>
                       <a:pPr algn="ctr"/>
                       <a:r>
-                        <a:rPr lang="en-US" sz="1800" b="1" i="0" kern="1200" dirty="0">
+                        <a:rPr lang="en-US" sz="1800" b="1" i="0" kern="1200">
                           <a:solidFill>
                             <a:schemeClr val="lt1"/>
                           </a:solidFill>
@@ -6304,7 +6493,7 @@
                         </a:rPr>
                         <a:t>PR curve</a:t>
                       </a:r>
-                      <a:endParaRPr lang="en-US" sz="2800" b="1" dirty="0"/>
+                      <a:endParaRPr lang="en-US" sz="2800" b="1"/>
                     </a:p>
                   </a:txBody>
                   <a:tcPr/>
@@ -6339,7 +6528,7 @@
                         <a:defRPr/>
                       </a:pPr>
                       <a:r>
-                        <a:rPr lang="en-US" sz="2400" b="1" i="0" kern="1200" dirty="0">
+                        <a:rPr lang="en-US" sz="2400" b="1" i="0" kern="1200">
                           <a:solidFill>
                             <a:schemeClr val="dk1"/>
                           </a:solidFill>
@@ -6361,7 +6550,7 @@
                     <a:p>
                       <a:pPr algn="ctr"/>
                       <a:r>
-                        <a:rPr lang="en-US" sz="2400" b="1" u="sng" dirty="0"/>
+                        <a:rPr lang="en-US" sz="2400" b="1" u="sng"/>
                         <a:t>0.66</a:t>
                       </a:r>
                     </a:p>
@@ -6375,7 +6564,7 @@
                     <a:p>
                       <a:pPr algn="ctr"/>
                       <a:r>
-                        <a:rPr lang="en-US" sz="2400" b="1" u="none" dirty="0"/>
+                        <a:rPr lang="en-US" sz="2400" b="1" u="none"/>
                         <a:t>0.47</a:t>
                       </a:r>
                     </a:p>
@@ -6396,7 +6585,7 @@
                     <a:p>
                       <a:pPr algn="ctr"/>
                       <a:r>
-                        <a:rPr lang="en-US" sz="2400" b="1" i="0" kern="1200" dirty="0">
+                        <a:rPr lang="en-US" sz="2400" b="1" i="0" kern="1200">
                           <a:solidFill>
                             <a:schemeClr val="dk1"/>
                           </a:solidFill>
@@ -6418,7 +6607,7 @@
                     <a:p>
                       <a:pPr algn="ctr"/>
                       <a:r>
-                        <a:rPr lang="en-US" sz="2400" b="1" i="0" kern="1200" dirty="0">
+                        <a:rPr lang="en-US" sz="2400" b="1" i="0" kern="1200">
                           <a:solidFill>
                             <a:schemeClr val="dk1"/>
                           </a:solidFill>
@@ -6427,7 +6616,7 @@
                           <a:ea typeface="+mn-ea"/>
                           <a:cs typeface="+mn-cs"/>
                         </a:rPr>
-                        <a:t>0.57</a:t>
+                        <a:t>0.58</a:t>
                       </a:r>
                     </a:p>
                   </a:txBody>
@@ -6440,7 +6629,7 @@
                     <a:p>
                       <a:pPr algn="ctr"/>
                       <a:r>
-                        <a:rPr lang="en-US" sz="2400" b="1" i="0" kern="1200" dirty="0">
+                        <a:rPr lang="en-US" sz="2400" b="1" i="0" kern="1200">
                           <a:solidFill>
                             <a:schemeClr val="dk1"/>
                           </a:solidFill>
@@ -6449,7 +6638,7 @@
                           <a:ea typeface="+mn-ea"/>
                           <a:cs typeface="+mn-cs"/>
                         </a:rPr>
-                        <a:t>0.46</a:t>
+                        <a:t>0.43</a:t>
                       </a:r>
                     </a:p>
                   </a:txBody>
@@ -6469,7 +6658,7 @@
                     <a:p>
                       <a:pPr algn="ctr"/>
                       <a:r>
-                        <a:rPr lang="en-US" sz="2400" b="1" i="0" kern="1200" dirty="0">
+                        <a:rPr lang="en-US" sz="2400" b="1" i="0" kern="1200">
                           <a:solidFill>
                             <a:schemeClr val="dk1"/>
                           </a:solidFill>
@@ -6491,7 +6680,7 @@
                     <a:p>
                       <a:pPr algn="ctr"/>
                       <a:r>
-                        <a:rPr lang="en-US" sz="2400" b="1" i="0" kern="1200" dirty="0">
+                        <a:rPr lang="en-US" sz="2400" b="1" i="0" kern="1200">
                           <a:solidFill>
                             <a:schemeClr val="dk1"/>
                           </a:solidFill>
@@ -6500,7 +6689,7 @@
                           <a:ea typeface="+mn-ea"/>
                           <a:cs typeface="+mn-cs"/>
                         </a:rPr>
-                        <a:t>0.53</a:t>
+                        <a:t>0.54</a:t>
                       </a:r>
                     </a:p>
                   </a:txBody>
@@ -6513,7 +6702,7 @@
                     <a:p>
                       <a:pPr algn="ctr"/>
                       <a:r>
-                        <a:rPr lang="en-US" sz="2400" b="1" i="0" kern="1200" dirty="0">
+                        <a:rPr lang="en-US" sz="2400" b="1" i="0" kern="1200">
                           <a:solidFill>
                             <a:schemeClr val="dk1"/>
                           </a:solidFill>
@@ -6522,7 +6711,7 @@
                           <a:ea typeface="+mn-ea"/>
                           <a:cs typeface="+mn-cs"/>
                         </a:rPr>
-                        <a:t>0.48</a:t>
+                        <a:t>0.44</a:t>
                       </a:r>
                     </a:p>
                   </a:txBody>
@@ -6542,7 +6731,7 @@
                     <a:p>
                       <a:pPr algn="ctr"/>
                       <a:r>
-                        <a:rPr lang="en-US" sz="2400" b="1" i="0" kern="1200" dirty="0">
+                        <a:rPr lang="en-US" sz="2400" b="1" i="0" kern="1200">
                           <a:solidFill>
                             <a:schemeClr val="dk1"/>
                           </a:solidFill>
@@ -6564,7 +6753,7 @@
                     <a:p>
                       <a:pPr algn="ctr"/>
                       <a:r>
-                        <a:rPr lang="en-US" sz="2400" b="1" i="0" kern="1200" dirty="0">
+                        <a:rPr lang="en-US" sz="2400" b="1" i="0" kern="1200">
                           <a:solidFill>
                             <a:schemeClr val="dk1"/>
                           </a:solidFill>
@@ -6573,7 +6762,7 @@
                           <a:ea typeface="+mn-ea"/>
                           <a:cs typeface="+mn-cs"/>
                         </a:rPr>
-                        <a:t>0.60</a:t>
+                        <a:t>0.61</a:t>
                       </a:r>
                     </a:p>
                   </a:txBody>
@@ -6586,7 +6775,7 @@
                     <a:p>
                       <a:pPr algn="ctr"/>
                       <a:r>
-                        <a:rPr lang="en-US" sz="2400" b="1" i="0" kern="1200" dirty="0">
+                        <a:rPr lang="en-US" sz="2400" b="1" i="0" kern="1200">
                           <a:solidFill>
                             <a:schemeClr val="dk1"/>
                           </a:solidFill>
@@ -6664,17 +6853,17 @@
           <a:lstStyle/>
           <a:p>
             <a:r>
-              <a:rPr lang="en-US" dirty="0">
+              <a:rPr lang="en-US">
                 <a:latin typeface="+mn-lt"/>
               </a:rPr>
               <a:t>Precision and Recall:</a:t>
             </a:r>
             <a:br>
-              <a:rPr lang="en-US" dirty="0">
+              <a:rPr lang="en-US">
                 <a:latin typeface="+mn-lt"/>
               </a:rPr>
             </a:br>
-            <a:endParaRPr lang="en-US" altLang="en-US" dirty="0">
+            <a:endParaRPr lang="en-US" altLang="en-US">
               <a:latin typeface="+mn-lt"/>
             </a:endParaRPr>
           </a:p>
@@ -6696,7 +6885,7 @@
             <p:ph idx="1"/>
             <p:extLst>
               <p:ext uri="{D42A27DB-BD31-4B8C-83A1-F6EECF244321}">
-                <p14:modId xmlns:p14="http://schemas.microsoft.com/office/powerpoint/2010/main" val="3799612305"/>
+                <p14:modId xmlns:p14="http://schemas.microsoft.com/office/powerpoint/2010/main" val="3570101260"/>
               </p:ext>
             </p:extLst>
           </p:nvPr>
@@ -6742,7 +6931,7 @@
                     <a:p>
                       <a:pPr algn="ctr"/>
                       <a:r>
-                        <a:rPr lang="en-US" sz="2800" dirty="0"/>
+                        <a:rPr lang="en-US" sz="2800"/>
                         <a:t>Model</a:t>
                       </a:r>
                     </a:p>
@@ -6756,7 +6945,7 @@
                     <a:p>
                       <a:pPr algn="ctr"/>
                       <a:r>
-                        <a:rPr lang="en-US" sz="2800" b="1" kern="1200" dirty="0">
+                        <a:rPr lang="en-US" sz="2800" b="1" kern="1200">
                           <a:solidFill>
                             <a:schemeClr val="lt1"/>
                           </a:solidFill>
@@ -6777,7 +6966,7 @@
                     <a:p>
                       <a:pPr algn="ctr"/>
                       <a:r>
-                        <a:rPr lang="en-US" sz="2800" b="1" kern="1200" dirty="0">
+                        <a:rPr lang="en-US" sz="2800" b="1" kern="1200">
                           <a:solidFill>
                             <a:schemeClr val="lt1"/>
                           </a:solidFill>
@@ -6821,7 +7010,7 @@
                         <a:defRPr/>
                       </a:pPr>
                       <a:r>
-                        <a:rPr lang="en-US" sz="2400" b="1" i="0" kern="1200" dirty="0">
+                        <a:rPr lang="en-US" sz="2400" b="1" i="0" kern="1200">
                           <a:solidFill>
                             <a:schemeClr val="dk1"/>
                           </a:solidFill>
@@ -6843,8 +7032,8 @@
                     <a:p>
                       <a:pPr algn="ctr"/>
                       <a:r>
-                        <a:rPr lang="en-US" sz="2400" b="1" dirty="0"/>
-                        <a:t>0.65</a:t>
+                        <a:rPr lang="en-US" sz="2400" b="1"/>
+                        <a:t>0.66</a:t>
                       </a:r>
                     </a:p>
                   </a:txBody>
@@ -6857,8 +7046,8 @@
                     <a:p>
                       <a:pPr algn="ctr"/>
                       <a:r>
-                        <a:rPr lang="en-US" sz="2400" b="1" u="sng" dirty="0"/>
-                        <a:t>0.36</a:t>
+                        <a:rPr lang="en-US" sz="2400" b="1" u="sng"/>
+                        <a:t>0.33</a:t>
                       </a:r>
                     </a:p>
                   </a:txBody>
@@ -6878,7 +7067,7 @@
                     <a:p>
                       <a:pPr algn="ctr"/>
                       <a:r>
-                        <a:rPr lang="en-US" sz="2400" b="1" i="0" kern="1200" dirty="0">
+                        <a:rPr lang="en-US" sz="2400" b="1" i="0" kern="1200">
                           <a:solidFill>
                             <a:schemeClr val="dk1"/>
                           </a:solidFill>
@@ -6900,7 +7089,80 @@
                     <a:p>
                       <a:pPr algn="ctr"/>
                       <a:r>
-                        <a:rPr lang="en-US" sz="2400" b="1" i="0" kern="1200" dirty="0">
+                        <a:rPr lang="en-US" sz="2400" b="1" i="0" kern="1200">
+                          <a:solidFill>
+                            <a:schemeClr val="dk1"/>
+                          </a:solidFill>
+                          <a:effectLst/>
+                          <a:latin typeface="+mn-lt"/>
+                          <a:ea typeface="+mn-ea"/>
+                          <a:cs typeface="+mn-cs"/>
+                        </a:rPr>
+                        <a:t>0.64</a:t>
+                      </a:r>
+                    </a:p>
+                  </a:txBody>
+                  <a:tcPr/>
+                </a:tc>
+                <a:tc>
+                  <a:txBody>
+                    <a:bodyPr/>
+                    <a:lstStyle/>
+                    <a:p>
+                      <a:pPr algn="ctr"/>
+                      <a:r>
+                        <a:rPr lang="en-US" sz="2400" b="1" i="0" kern="1200">
+                          <a:solidFill>
+                            <a:schemeClr val="dk1"/>
+                          </a:solidFill>
+                          <a:effectLst/>
+                          <a:latin typeface="+mn-lt"/>
+                          <a:ea typeface="+mn-ea"/>
+                          <a:cs typeface="+mn-cs"/>
+                        </a:rPr>
+                        <a:t>0.18</a:t>
+                      </a:r>
+                    </a:p>
+                  </a:txBody>
+                  <a:tcPr/>
+                </a:tc>
+                <a:extLst>
+                  <a:ext uri="{0D108BD9-81ED-4DB2-BD59-A6C34878D82A}">
+                    <a16:rowId xmlns:a16="http://schemas.microsoft.com/office/drawing/2014/main" val="65504439"/>
+                  </a:ext>
+                </a:extLst>
+              </a:tr>
+              <a:tr h="689554">
+                <a:tc>
+                  <a:txBody>
+                    <a:bodyPr/>
+                    <a:lstStyle/>
+                    <a:p>
+                      <a:pPr algn="ctr"/>
+                      <a:r>
+                        <a:rPr lang="en-US" sz="2400" b="1" i="0" kern="1200">
+                          <a:solidFill>
+                            <a:schemeClr val="dk1"/>
+                          </a:solidFill>
+                          <a:effectLst/>
+                          <a:latin typeface="+mn-lt"/>
+                          <a:ea typeface="+mn-ea"/>
+                          <a:cs typeface="+mn-cs"/>
+                        </a:rPr>
+                        <a:t>Random Forest Classifier</a:t>
+                      </a:r>
+                    </a:p>
+                  </a:txBody>
+                  <a:tcPr/>
+                </a:tc>
+                <a:tc>
+                  <a:txBody>
+                    <a:bodyPr/>
+                    <a:lstStyle/>
+                    <a:p>
+                      <a:pPr algn="ctr"/>
+                      <a:r>
+                        <a:rPr lang="en-US" sz="2400" b="1" i="0" u="sng" kern="1200">
                           <a:solidFill>
                             <a:schemeClr val="dk1"/>
                           </a:solidFill>
@@ -6922,7 +7184,7 @@
                     <a:p>
                       <a:pPr algn="ctr"/>
                       <a:r>
-                        <a:rPr lang="en-US" sz="2400" b="1" i="0" kern="1200" dirty="0">
+                        <a:rPr lang="en-US" sz="2400" b="1" i="0" kern="1200">
                           <a:solidFill>
                             <a:schemeClr val="dk1"/>
                           </a:solidFill>
@@ -6931,80 +7193,7 @@
                           <a:ea typeface="+mn-ea"/>
                           <a:cs typeface="+mn-cs"/>
                         </a:rPr>
-                        <a:t>0.16</a:t>
-                      </a:r>
-                    </a:p>
-                  </a:txBody>
-                  <a:tcPr/>
-                </a:tc>
-                <a:extLst>
-                  <a:ext uri="{0D108BD9-81ED-4DB2-BD59-A6C34878D82A}">
-                    <a16:rowId xmlns:a16="http://schemas.microsoft.com/office/drawing/2014/main" val="65504439"/>
-                  </a:ext>
-                </a:extLst>
-              </a:tr>
-              <a:tr h="689554">
-                <a:tc>
-                  <a:txBody>
-                    <a:bodyPr/>
-                    <a:lstStyle/>
-                    <a:p>
-                      <a:pPr algn="ctr"/>
-                      <a:r>
-                        <a:rPr lang="en-US" sz="2400" b="1" i="0" kern="1200" dirty="0">
-                          <a:solidFill>
-                            <a:schemeClr val="dk1"/>
-                          </a:solidFill>
-                          <a:effectLst/>
-                          <a:latin typeface="+mn-lt"/>
-                          <a:ea typeface="+mn-ea"/>
-                          <a:cs typeface="+mn-cs"/>
-                        </a:rPr>
-                        <a:t>Random Forest Classifier</a:t>
-                      </a:r>
-                    </a:p>
-                  </a:txBody>
-                  <a:tcPr/>
-                </a:tc>
-                <a:tc>
-                  <a:txBody>
-                    <a:bodyPr/>
-                    <a:lstStyle/>
-                    <a:p>
-                      <a:pPr algn="ctr"/>
-                      <a:r>
-                        <a:rPr lang="en-US" sz="2400" b="1" i="0" u="sng" kern="1200" dirty="0">
-                          <a:solidFill>
-                            <a:schemeClr val="dk1"/>
-                          </a:solidFill>
-                          <a:effectLst/>
-                          <a:latin typeface="+mn-lt"/>
-                          <a:ea typeface="+mn-ea"/>
-                          <a:cs typeface="+mn-cs"/>
-                        </a:rPr>
-                        <a:t>0.81</a:t>
-                      </a:r>
-                    </a:p>
-                  </a:txBody>
-                  <a:tcPr/>
-                </a:tc>
-                <a:tc>
-                  <a:txBody>
-                    <a:bodyPr/>
-                    <a:lstStyle/>
-                    <a:p>
-                      <a:pPr algn="ctr"/>
-                      <a:r>
-                        <a:rPr lang="en-US" sz="2400" b="1" i="0" kern="1200" dirty="0">
-                          <a:solidFill>
-                            <a:schemeClr val="dk1"/>
-                          </a:solidFill>
-                          <a:effectLst/>
-                          <a:latin typeface="+mn-lt"/>
-                          <a:ea typeface="+mn-ea"/>
-                          <a:cs typeface="+mn-cs"/>
-                        </a:rPr>
-                        <a:t>0.07</a:t>
+                        <a:t>0.08</a:t>
                       </a:r>
                     </a:p>
                   </a:txBody>
@@ -7024,7 +7213,7 @@
                     <a:p>
                       <a:pPr algn="ctr"/>
                       <a:r>
-                        <a:rPr lang="en-US" sz="2400" b="1" i="0" kern="1200" dirty="0">
+                        <a:rPr lang="en-US" sz="2400" b="1" i="0" kern="1200">
                           <a:solidFill>
                             <a:schemeClr val="dk1"/>
                           </a:solidFill>
@@ -7046,7 +7235,7 @@
                     <a:p>
                       <a:pPr algn="ctr"/>
                       <a:r>
-                        <a:rPr lang="en-US" sz="2400" b="1" i="0" kern="1200" dirty="0">
+                        <a:rPr lang="en-US" sz="2400" b="1" i="0" kern="1200">
                           <a:solidFill>
                             <a:schemeClr val="dk1"/>
                           </a:solidFill>
@@ -7055,7 +7244,7 @@
                           <a:ea typeface="+mn-ea"/>
                           <a:cs typeface="+mn-cs"/>
                         </a:rPr>
-                        <a:t>0.67</a:t>
+                        <a:t>0.64</a:t>
                       </a:r>
                     </a:p>
                   </a:txBody>
@@ -7068,7 +7257,7 @@
                     <a:p>
                       <a:pPr algn="ctr"/>
                       <a:r>
-                        <a:rPr lang="en-US" sz="2400" b="1" i="0" kern="1200" dirty="0">
+                        <a:rPr lang="en-US" sz="2400" b="1" i="0" kern="1200">
                           <a:solidFill>
                             <a:schemeClr val="dk1"/>
                           </a:solidFill>
@@ -7077,7 +7266,7 @@
                           <a:ea typeface="+mn-ea"/>
                           <a:cs typeface="+mn-cs"/>
                         </a:rPr>
-                        <a:t>0.21</a:t>
+                        <a:t>0.23</a:t>
                       </a:r>
                     </a:p>
                   </a:txBody>

</xml_diff>